<commit_message>
# cambie unas cositas en el diagrama de arquitectura
</commit_message>
<xml_diff>
--- a/analysisAndDesign/diagrama_arquitectura.pptx
+++ b/analysisAndDesign/diagrama_arquitectura.pptx
@@ -3425,7 +3425,7 @@
         </p:nvSpPr>
         <p:spPr>
           <a:xfrm>
-            <a:off x="3459377" y="63198"/>
+            <a:off x="3468902" y="63198"/>
             <a:ext cx="1368338" cy="369332"/>
           </a:xfrm>
           <a:prstGeom prst="rect">
@@ -3439,17 +3439,6 @@
           </a:bodyPr>
           <a:lstStyle/>
           <a:p>
-            <a:r>
-              <a:rPr lang="es-AR" dirty="0" err="1" smtClean="0">
-                <a:solidFill>
-                  <a:schemeClr val="accent3">
-                    <a:lumMod val="50000"/>
-                  </a:schemeClr>
-                </a:solidFill>
-                <a:latin typeface="Cambria" pitchFamily="18" charset="0"/>
-              </a:rPr>
-              <a:t>Private</a:t>
-            </a:r>
             <a:r>
               <a:rPr lang="es-AR" dirty="0" smtClean="0">
                 <a:solidFill>
@@ -3459,7 +3448,7 @@
                 </a:solidFill>
                 <a:latin typeface="Cambria" pitchFamily="18" charset="0"/>
               </a:rPr>
-              <a:t> LAN</a:t>
+              <a:t>LAN</a:t>
             </a:r>
             <a:endParaRPr lang="es-AR" dirty="0">
               <a:solidFill>

</xml_diff>

<commit_message>
# actualice el logo en el diagrama de arquitectura
</commit_message>
<xml_diff>
--- a/analysisAndDesign/diagrama_arquitectura.pptx
+++ b/analysisAndDesign/diagrama_arquitectura.pptx
@@ -3575,150 +3575,73 @@
           </a:fontRef>
         </p:style>
       </p:cxnSp>
-      <p:pic>
-        <p:nvPicPr>
-          <p:cNvPr id="1036" name="Picture 12"/>
-          <p:cNvPicPr>
-            <a:picLocks noChangeAspect="1" noChangeArrowheads="1"/>
-          </p:cNvPicPr>
-          <p:nvPr/>
-        </p:nvPicPr>
-        <p:blipFill>
-          <a:blip r:embed="rId5" cstate="print">
-            <a:clrChange>
-              <a:clrFrom>
-                <a:srgbClr val="FFFFFF"/>
-              </a:clrFrom>
-              <a:clrTo>
-                <a:srgbClr val="FFFFFF">
-                  <a:alpha val="0"/>
-                </a:srgbClr>
-              </a:clrTo>
-            </a:clrChange>
-          </a:blip>
-          <a:srcRect/>
-          <a:stretch>
-            <a:fillRect/>
-          </a:stretch>
-        </p:blipFill>
-        <p:spPr bwMode="auto">
-          <a:xfrm>
-            <a:off x="5288177" y="2119106"/>
-            <a:ext cx="514350" cy="514350"/>
-          </a:xfrm>
-          <a:prstGeom prst="rect">
-            <a:avLst/>
-          </a:prstGeom>
-          <a:noFill/>
-          <a:ln w="9525">
-            <a:noFill/>
-            <a:miter lim="800000"/>
-            <a:headEnd/>
-            <a:tailEnd/>
-          </a:ln>
-        </p:spPr>
-      </p:pic>
-      <p:sp>
-        <p:nvSpPr>
-          <p:cNvPr id="124" name="123 CuadroTexto"/>
-          <p:cNvSpPr txBox="1"/>
-          <p:nvPr/>
-        </p:nvSpPr>
-        <p:spPr>
-          <a:xfrm>
-            <a:off x="4926227" y="1958673"/>
-            <a:ext cx="1295400" cy="230832"/>
-          </a:xfrm>
-          <a:prstGeom prst="rect">
-            <a:avLst/>
-          </a:prstGeom>
-          <a:noFill/>
-        </p:spPr>
-        <p:txBody>
-          <a:bodyPr wrap="square" rtlCol="0">
-            <a:spAutoFit/>
-          </a:bodyPr>
-          <a:lstStyle/>
-          <a:p>
-            <a:pPr algn="ctr"/>
-            <a:r>
-              <a:rPr lang="es-AR" sz="900" b="1" dirty="0" smtClean="0"/>
-              <a:t>Base de Datos</a:t>
-            </a:r>
-            <a:endParaRPr lang="es-AR" sz="900" b="1" dirty="0"/>
-          </a:p>
-        </p:txBody>
-      </p:sp>
       <p:grpSp>
         <p:nvGrpSpPr>
-          <p:cNvPr id="138" name="137 Grupo"/>
+          <p:cNvPr id="90" name="89 Grupo"/>
           <p:cNvGrpSpPr/>
           <p:nvPr/>
         </p:nvGrpSpPr>
         <p:grpSpPr>
           <a:xfrm>
-            <a:off x="2258248" y="3686828"/>
-            <a:ext cx="1401499" cy="369332"/>
-            <a:chOff x="1341700" y="2380525"/>
-            <a:chExt cx="1401499" cy="369332"/>
+            <a:off x="4926227" y="1958673"/>
+            <a:ext cx="1295400" cy="674783"/>
+            <a:chOff x="4926227" y="1958673"/>
+            <a:chExt cx="1295400" cy="674783"/>
           </a:xfrm>
         </p:grpSpPr>
-        <p:sp>
-          <p:nvSpPr>
-            <p:cNvPr id="136" name="135 Rectángulo"/>
-            <p:cNvSpPr/>
+        <p:pic>
+          <p:nvPicPr>
+            <p:cNvPr id="1036" name="Picture 12"/>
+            <p:cNvPicPr>
+              <a:picLocks noChangeAspect="1" noChangeArrowheads="1"/>
+            </p:cNvPicPr>
             <p:nvPr/>
-          </p:nvSpPr>
-          <p:spPr>
+          </p:nvPicPr>
+          <p:blipFill>
+            <a:blip r:embed="rId5" cstate="print">
+              <a:clrChange>
+                <a:clrFrom>
+                  <a:srgbClr val="FFFFFF"/>
+                </a:clrFrom>
+                <a:clrTo>
+                  <a:srgbClr val="FFFFFF">
+                    <a:alpha val="0"/>
+                  </a:srgbClr>
+                </a:clrTo>
+              </a:clrChange>
+            </a:blip>
+            <a:srcRect/>
+            <a:stretch>
+              <a:fillRect/>
+            </a:stretch>
+          </p:blipFill>
+          <p:spPr bwMode="auto">
             <a:xfrm>
-              <a:off x="1704628" y="2428875"/>
-              <a:ext cx="1038571" cy="274320"/>
+              <a:off x="5288177" y="2119106"/>
+              <a:ext cx="514350" cy="514350"/>
             </a:xfrm>
             <a:prstGeom prst="rect">
               <a:avLst/>
             </a:prstGeom>
-            <a:solidFill>
-              <a:schemeClr val="bg1"/>
-            </a:solidFill>
-            <a:ln>
+            <a:noFill/>
+            <a:ln w="9525">
               <a:noFill/>
+              <a:miter lim="800000"/>
+              <a:headEnd/>
+              <a:tailEnd/>
             </a:ln>
           </p:spPr>
-          <p:style>
-            <a:lnRef idx="2">
-              <a:schemeClr val="accent1">
-                <a:shade val="50000"/>
-              </a:schemeClr>
-            </a:lnRef>
-            <a:fillRef idx="1">
-              <a:schemeClr val="accent1"/>
-            </a:fillRef>
-            <a:effectRef idx="0">
-              <a:schemeClr val="accent1"/>
-            </a:effectRef>
-            <a:fontRef idx="minor">
-              <a:schemeClr val="lt1"/>
-            </a:fontRef>
-          </p:style>
-          <p:txBody>
-            <a:bodyPr rtlCol="0" anchor="ctr"/>
-            <a:lstStyle/>
-            <a:p>
-              <a:pPr algn="ctr"/>
-              <a:endParaRPr lang="es-AR" sz="1600"/>
-            </a:p>
-          </p:txBody>
-        </p:sp>
+        </p:pic>
         <p:sp>
           <p:nvSpPr>
-            <p:cNvPr id="137" name="136 CuadroTexto"/>
+            <p:cNvPr id="124" name="123 CuadroTexto"/>
             <p:cNvSpPr txBox="1"/>
             <p:nvPr/>
           </p:nvSpPr>
           <p:spPr>
             <a:xfrm>
-              <a:off x="1341700" y="2380525"/>
-              <a:ext cx="1295400" cy="369332"/>
+              <a:off x="4926227" y="1958673"/>
+              <a:ext cx="1295400" cy="230832"/>
             </a:xfrm>
             <a:prstGeom prst="rect">
               <a:avLst/>
@@ -3734,56 +3657,163 @@
               <a:pPr algn="ctr"/>
               <a:r>
                 <a:rPr lang="es-AR" sz="900" b="1" dirty="0" smtClean="0"/>
-                <a:t>Servicio de Autenticación</a:t>
+                <a:t>Base de Datos</a:t>
               </a:r>
               <a:endParaRPr lang="es-AR" sz="900" b="1" dirty="0"/>
             </a:p>
           </p:txBody>
         </p:sp>
       </p:grpSp>
-      <p:pic>
-        <p:nvPicPr>
-          <p:cNvPr id="1028" name="Picture 4"/>
-          <p:cNvPicPr>
-            <a:picLocks noChangeAspect="1" noChangeArrowheads="1"/>
-          </p:cNvPicPr>
+      <p:grpSp>
+        <p:nvGrpSpPr>
+          <p:cNvPr id="89" name="88 Grupo"/>
+          <p:cNvGrpSpPr/>
           <p:nvPr/>
-        </p:nvPicPr>
-        <p:blipFill>
-          <a:blip r:embed="rId6" cstate="print">
-            <a:clrChange>
-              <a:clrFrom>
-                <a:srgbClr val="FFFFFF"/>
-              </a:clrFrom>
-              <a:clrTo>
-                <a:srgbClr val="FFFFFF">
-                  <a:alpha val="0"/>
-                </a:srgbClr>
-              </a:clrTo>
-            </a:clrChange>
-          </a:blip>
-          <a:srcRect/>
-          <a:stretch>
-            <a:fillRect/>
-          </a:stretch>
-        </p:blipFill>
-        <p:spPr bwMode="auto">
-          <a:xfrm rot="202572">
-            <a:off x="3160623" y="3381622"/>
-            <a:ext cx="465939" cy="542532"/>
+        </p:nvGrpSpPr>
+        <p:grpSpPr>
+          <a:xfrm>
+            <a:off x="2279838" y="3381622"/>
+            <a:ext cx="1346724" cy="668188"/>
+            <a:chOff x="2279838" y="3381622"/>
+            <a:chExt cx="1346724" cy="668188"/>
           </a:xfrm>
-          <a:prstGeom prst="rect">
-            <a:avLst/>
-          </a:prstGeom>
-          <a:noFill/>
-          <a:ln w="9525">
+        </p:grpSpPr>
+        <p:grpSp>
+          <p:nvGrpSpPr>
+            <p:cNvPr id="138" name="137 Grupo"/>
+            <p:cNvGrpSpPr/>
+            <p:nvPr/>
+          </p:nvGrpSpPr>
+          <p:grpSpPr>
+            <a:xfrm>
+              <a:off x="2279838" y="3680478"/>
+              <a:ext cx="1295400" cy="369332"/>
+              <a:chOff x="1363290" y="2374175"/>
+              <a:chExt cx="1295400" cy="369332"/>
+            </a:xfrm>
+          </p:grpSpPr>
+          <p:sp>
+            <p:nvSpPr>
+              <p:cNvPr id="136" name="135 Rectángulo"/>
+              <p:cNvSpPr/>
+              <p:nvPr/>
+            </p:nvSpPr>
+            <p:spPr>
+              <a:xfrm>
+                <a:off x="1518677" y="2459247"/>
+                <a:ext cx="930621" cy="216000"/>
+              </a:xfrm>
+              <a:prstGeom prst="rect">
+                <a:avLst/>
+              </a:prstGeom>
+              <a:solidFill>
+                <a:schemeClr val="bg1"/>
+              </a:solidFill>
+              <a:ln>
+                <a:noFill/>
+              </a:ln>
+            </p:spPr>
+            <p:style>
+              <a:lnRef idx="2">
+                <a:schemeClr val="accent1">
+                  <a:shade val="50000"/>
+                </a:schemeClr>
+              </a:lnRef>
+              <a:fillRef idx="1">
+                <a:schemeClr val="accent1"/>
+              </a:fillRef>
+              <a:effectRef idx="0">
+                <a:schemeClr val="accent1"/>
+              </a:effectRef>
+              <a:fontRef idx="minor">
+                <a:schemeClr val="lt1"/>
+              </a:fontRef>
+            </p:style>
+            <p:txBody>
+              <a:bodyPr rtlCol="0" anchor="ctr"/>
+              <a:lstStyle/>
+              <a:p>
+                <a:pPr algn="ctr"/>
+                <a:endParaRPr lang="es-AR" sz="1600"/>
+              </a:p>
+            </p:txBody>
+          </p:sp>
+          <p:sp>
+            <p:nvSpPr>
+              <p:cNvPr id="137" name="136 CuadroTexto"/>
+              <p:cNvSpPr txBox="1"/>
+              <p:nvPr/>
+            </p:nvSpPr>
+            <p:spPr>
+              <a:xfrm>
+                <a:off x="1363290" y="2374175"/>
+                <a:ext cx="1295400" cy="369332"/>
+              </a:xfrm>
+              <a:prstGeom prst="rect">
+                <a:avLst/>
+              </a:prstGeom>
+              <a:noFill/>
+            </p:spPr>
+            <p:txBody>
+              <a:bodyPr wrap="square" rtlCol="0">
+                <a:spAutoFit/>
+              </a:bodyPr>
+              <a:lstStyle/>
+              <a:p>
+                <a:pPr algn="ctr"/>
+                <a:r>
+                  <a:rPr lang="es-AR" sz="900" b="1" dirty="0" smtClean="0"/>
+                  <a:t>Servicio de Autenticación</a:t>
+                </a:r>
+                <a:endParaRPr lang="es-AR" sz="900" b="1" dirty="0"/>
+              </a:p>
+            </p:txBody>
+          </p:sp>
+        </p:grpSp>
+        <p:pic>
+          <p:nvPicPr>
+            <p:cNvPr id="1028" name="Picture 4"/>
+            <p:cNvPicPr>
+              <a:picLocks noChangeAspect="1" noChangeArrowheads="1"/>
+            </p:cNvPicPr>
+            <p:nvPr/>
+          </p:nvPicPr>
+          <p:blipFill>
+            <a:blip r:embed="rId6" cstate="print">
+              <a:clrChange>
+                <a:clrFrom>
+                  <a:srgbClr val="FFFFFF"/>
+                </a:clrFrom>
+                <a:clrTo>
+                  <a:srgbClr val="FFFFFF">
+                    <a:alpha val="0"/>
+                  </a:srgbClr>
+                </a:clrTo>
+              </a:clrChange>
+            </a:blip>
+            <a:srcRect/>
+            <a:stretch>
+              <a:fillRect/>
+            </a:stretch>
+          </p:blipFill>
+          <p:spPr bwMode="auto">
+            <a:xfrm rot="202572">
+              <a:off x="3160623" y="3381622"/>
+              <a:ext cx="465939" cy="542532"/>
+            </a:xfrm>
+            <a:prstGeom prst="rect">
+              <a:avLst/>
+            </a:prstGeom>
             <a:noFill/>
-            <a:miter lim="800000"/>
-            <a:headEnd/>
-            <a:tailEnd/>
-          </a:ln>
-        </p:spPr>
-      </p:pic>
+            <a:ln w="9525">
+              <a:noFill/>
+              <a:miter lim="800000"/>
+              <a:headEnd/>
+              <a:tailEnd/>
+            </a:ln>
+          </p:spPr>
+        </p:pic>
+      </p:grpSp>
       <p:cxnSp>
         <p:nvCxnSpPr>
           <p:cNvPr id="105" name="104 Conector recto de flecha"/>
@@ -3864,8 +3894,8 @@
         </p:nvCxnSpPr>
         <p:spPr>
           <a:xfrm rot="10800000">
-            <a:off x="3640353" y="3863673"/>
-            <a:ext cx="1499901" cy="955484"/>
+            <a:off x="3607125" y="3924300"/>
+            <a:ext cx="1584000" cy="900000"/>
           </a:xfrm>
           <a:prstGeom prst="straightConnector1">
             <a:avLst/>
@@ -3902,8 +3932,8 @@
           <p:nvPr/>
         </p:nvSpPr>
         <p:spPr>
-          <a:xfrm rot="1927031">
-            <a:off x="3862656" y="4199829"/>
+          <a:xfrm rot="1762167">
+            <a:off x="3919806" y="4250629"/>
             <a:ext cx="1219200" cy="230832"/>
           </a:xfrm>
           <a:prstGeom prst="rect">
@@ -4125,126 +4155,6 @@
           </a:fontRef>
         </p:style>
       </p:cxnSp>
-      <p:grpSp>
-        <p:nvGrpSpPr>
-          <p:cNvPr id="83" name="82 Grupo"/>
-          <p:cNvGrpSpPr/>
-          <p:nvPr/>
-        </p:nvGrpSpPr>
-        <p:grpSpPr>
-          <a:xfrm>
-            <a:off x="5145302" y="4560903"/>
-            <a:ext cx="1301115" cy="946547"/>
-            <a:chOff x="5145302" y="4560903"/>
-            <a:chExt cx="1301115" cy="946547"/>
-          </a:xfrm>
-        </p:grpSpPr>
-        <p:pic>
-          <p:nvPicPr>
-            <p:cNvPr id="1030" name="Picture 6"/>
-            <p:cNvPicPr>
-              <a:picLocks noChangeAspect="1" noChangeArrowheads="1"/>
-            </p:cNvPicPr>
-            <p:nvPr/>
-          </p:nvPicPr>
-          <p:blipFill>
-            <a:blip r:embed="rId8" cstate="print">
-              <a:clrChange>
-                <a:clrFrom>
-                  <a:srgbClr val="FFFFFF"/>
-                </a:clrFrom>
-                <a:clrTo>
-                  <a:srgbClr val="FFFFFF">
-                    <a:alpha val="0"/>
-                  </a:srgbClr>
-                </a:clrTo>
-              </a:clrChange>
-            </a:blip>
-            <a:srcRect/>
-            <a:stretch>
-              <a:fillRect/>
-            </a:stretch>
-          </p:blipFill>
-          <p:spPr bwMode="auto">
-            <a:xfrm>
-              <a:off x="5227217" y="4560903"/>
-              <a:ext cx="446791" cy="612742"/>
-            </a:xfrm>
-            <a:prstGeom prst="rect">
-              <a:avLst/>
-            </a:prstGeom>
-            <a:noFill/>
-            <a:ln w="9525">
-              <a:noFill/>
-              <a:miter lim="800000"/>
-              <a:headEnd/>
-              <a:tailEnd/>
-            </a:ln>
-          </p:spPr>
-        </p:pic>
-        <p:sp>
-          <p:nvSpPr>
-            <p:cNvPr id="123" name="122 CuadroTexto"/>
-            <p:cNvSpPr txBox="1"/>
-            <p:nvPr/>
-          </p:nvSpPr>
-          <p:spPr>
-            <a:xfrm>
-              <a:off x="5145302" y="5138118"/>
-              <a:ext cx="1301115" cy="369332"/>
-            </a:xfrm>
-            <a:prstGeom prst="rect">
-              <a:avLst/>
-            </a:prstGeom>
-            <a:noFill/>
-          </p:spPr>
-          <p:txBody>
-            <a:bodyPr wrap="square" rtlCol="0">
-              <a:spAutoFit/>
-            </a:bodyPr>
-            <a:lstStyle/>
-            <a:p>
-              <a:pPr algn="ctr"/>
-              <a:r>
-                <a:rPr lang="es-AR" sz="900" b="1" smtClean="0"/>
-                <a:t>SelfManagement</a:t>
-              </a:r>
-            </a:p>
-            <a:p>
-              <a:pPr algn="ctr"/>
-              <a:r>
-                <a:rPr lang="es-AR" sz="900" b="1" smtClean="0"/>
-                <a:t>Web Site</a:t>
-              </a:r>
-              <a:endParaRPr lang="es-AR" sz="900" b="1"/>
-            </a:p>
-          </p:txBody>
-        </p:sp>
-        <p:pic>
-          <p:nvPicPr>
-            <p:cNvPr id="152" name="151 Imagen" descr="selfmanagement_logo.png"/>
-            <p:cNvPicPr>
-              <a:picLocks noChangeAspect="1"/>
-            </p:cNvPicPr>
-            <p:nvPr/>
-          </p:nvPicPr>
-          <p:blipFill>
-            <a:blip r:embed="rId9" cstate="print"/>
-            <a:stretch>
-              <a:fillRect/>
-            </a:stretch>
-          </p:blipFill>
-          <p:spPr>
-            <a:xfrm>
-              <a:off x="5707277" y="4907675"/>
-              <a:ext cx="665948" cy="251398"/>
-            </a:xfrm>
-            <a:prstGeom prst="rect">
-              <a:avLst/>
-            </a:prstGeom>
-          </p:spPr>
-        </p:pic>
-      </p:grpSp>
       <p:grpSp>
         <p:nvGrpSpPr>
           <p:cNvPr id="161" name="160 Grupo"/>
@@ -4513,140 +4423,155 @@
           </p:spPr>
         </p:pic>
       </p:grpSp>
-      <p:pic>
-        <p:nvPicPr>
-          <p:cNvPr id="52" name="Picture 4"/>
-          <p:cNvPicPr>
-            <a:picLocks noChangeAspect="1" noChangeArrowheads="1"/>
-          </p:cNvPicPr>
-          <p:nvPr/>
-        </p:nvPicPr>
-        <p:blipFill>
-          <a:blip r:embed="rId6" cstate="print">
-            <a:clrChange>
-              <a:clrFrom>
-                <a:srgbClr val="FFFFFF"/>
-              </a:clrFrom>
-              <a:clrTo>
-                <a:srgbClr val="FFFFFF">
-                  <a:alpha val="0"/>
-                </a:srgbClr>
-              </a:clrTo>
-            </a:clrChange>
-          </a:blip>
-          <a:srcRect/>
-          <a:stretch>
-            <a:fillRect/>
-          </a:stretch>
-        </p:blipFill>
-        <p:spPr bwMode="auto">
-          <a:xfrm rot="202572">
-            <a:off x="4170273" y="2772023"/>
-            <a:ext cx="465939" cy="542532"/>
-          </a:xfrm>
-          <a:prstGeom prst="rect">
-            <a:avLst/>
-          </a:prstGeom>
-          <a:noFill/>
-          <a:ln w="9525">
-            <a:noFill/>
-            <a:miter lim="800000"/>
-            <a:headEnd/>
-            <a:tailEnd/>
-          </a:ln>
-        </p:spPr>
-      </p:pic>
       <p:grpSp>
         <p:nvGrpSpPr>
-          <p:cNvPr id="53" name="52 Grupo"/>
+          <p:cNvPr id="88" name="87 Grupo"/>
           <p:cNvGrpSpPr/>
           <p:nvPr/>
         </p:nvGrpSpPr>
         <p:grpSpPr>
           <a:xfrm>
-            <a:off x="4516652" y="3063573"/>
-            <a:ext cx="1076325" cy="230832"/>
-            <a:chOff x="1427425" y="2418625"/>
-            <a:chExt cx="1076325" cy="230832"/>
+            <a:off x="4170273" y="2772023"/>
+            <a:ext cx="1398042" cy="542532"/>
+            <a:chOff x="4170273" y="2772023"/>
+            <a:chExt cx="1398042" cy="542532"/>
           </a:xfrm>
         </p:grpSpPr>
-        <p:sp>
-          <p:nvSpPr>
-            <p:cNvPr id="54" name="53 Rectángulo"/>
-            <p:cNvSpPr/>
+        <p:pic>
+          <p:nvPicPr>
+            <p:cNvPr id="52" name="Picture 4"/>
+            <p:cNvPicPr>
+              <a:picLocks noChangeAspect="1" noChangeArrowheads="1"/>
+            </p:cNvPicPr>
             <p:nvPr/>
-          </p:nvSpPr>
-          <p:spPr>
-            <a:xfrm>
-              <a:off x="1543050" y="2418625"/>
-              <a:ext cx="951175" cy="209550"/>
-            </a:xfrm>
-            <a:prstGeom prst="rect">
-              <a:avLst/>
-            </a:prstGeom>
-            <a:solidFill>
-              <a:schemeClr val="bg1"/>
-            </a:solidFill>
-            <a:ln>
-              <a:noFill/>
-            </a:ln>
-          </p:spPr>
-          <p:style>
-            <a:lnRef idx="2">
-              <a:schemeClr val="accent1">
-                <a:shade val="50000"/>
-              </a:schemeClr>
-            </a:lnRef>
-            <a:fillRef idx="1">
-              <a:schemeClr val="accent1"/>
-            </a:fillRef>
-            <a:effectRef idx="0">
-              <a:schemeClr val="accent1"/>
-            </a:effectRef>
-            <a:fontRef idx="minor">
-              <a:schemeClr val="lt1"/>
-            </a:fontRef>
-          </p:style>
-          <p:txBody>
-            <a:bodyPr rtlCol="0" anchor="ctr"/>
-            <a:lstStyle/>
-            <a:p>
-              <a:pPr algn="ctr"/>
-              <a:endParaRPr lang="es-AR" sz="1600"/>
-            </a:p>
-          </p:txBody>
-        </p:sp>
-        <p:sp>
-          <p:nvSpPr>
-            <p:cNvPr id="55" name="54 CuadroTexto"/>
-            <p:cNvSpPr txBox="1"/>
-            <p:nvPr/>
-          </p:nvSpPr>
-          <p:spPr>
-            <a:xfrm>
-              <a:off x="1427425" y="2418625"/>
-              <a:ext cx="1076325" cy="230832"/>
+          </p:nvPicPr>
+          <p:blipFill>
+            <a:blip r:embed="rId6" cstate="print">
+              <a:clrChange>
+                <a:clrFrom>
+                  <a:srgbClr val="FFFFFF"/>
+                </a:clrFrom>
+                <a:clrTo>
+                  <a:srgbClr val="FFFFFF">
+                    <a:alpha val="0"/>
+                  </a:srgbClr>
+                </a:clrTo>
+              </a:clrChange>
+            </a:blip>
+            <a:srcRect/>
+            <a:stretch>
+              <a:fillRect/>
+            </a:stretch>
+          </p:blipFill>
+          <p:spPr bwMode="auto">
+            <a:xfrm rot="202572">
+              <a:off x="4170273" y="2772023"/>
+              <a:ext cx="465939" cy="542532"/>
             </a:xfrm>
             <a:prstGeom prst="rect">
               <a:avLst/>
             </a:prstGeom>
             <a:noFill/>
+            <a:ln w="9525">
+              <a:noFill/>
+              <a:miter lim="800000"/>
+              <a:headEnd/>
+              <a:tailEnd/>
+            </a:ln>
           </p:spPr>
-          <p:txBody>
-            <a:bodyPr wrap="square" rtlCol="0">
-              <a:spAutoFit/>
-            </a:bodyPr>
-            <a:lstStyle/>
-            <a:p>
-              <a:pPr algn="ctr"/>
-              <a:r>
-                <a:rPr lang="es-AR" sz="900" b="1" dirty="0" smtClean="0"/>
-                <a:t>Servicio de Datos</a:t>
-              </a:r>
-              <a:endParaRPr lang="es-AR" sz="900" b="1" dirty="0"/>
-            </a:p>
-          </p:txBody>
-        </p:sp>
+        </p:pic>
+        <p:grpSp>
+          <p:nvGrpSpPr>
+            <p:cNvPr id="53" name="52 Grupo"/>
+            <p:cNvGrpSpPr/>
+            <p:nvPr/>
+          </p:nvGrpSpPr>
+          <p:grpSpPr>
+            <a:xfrm>
+              <a:off x="4491990" y="3070225"/>
+              <a:ext cx="1076325" cy="230832"/>
+              <a:chOff x="1402763" y="2425277"/>
+              <a:chExt cx="1076325" cy="230832"/>
+            </a:xfrm>
+          </p:grpSpPr>
+          <p:sp>
+            <p:nvSpPr>
+              <p:cNvPr id="54" name="53 Rectángulo"/>
+              <p:cNvSpPr/>
+              <p:nvPr/>
+            </p:nvSpPr>
+            <p:spPr>
+              <a:xfrm>
+                <a:off x="1543050" y="2485600"/>
+                <a:ext cx="930323" cy="108000"/>
+              </a:xfrm>
+              <a:prstGeom prst="rect">
+                <a:avLst/>
+              </a:prstGeom>
+              <a:solidFill>
+                <a:schemeClr val="bg1"/>
+              </a:solidFill>
+              <a:ln>
+                <a:noFill/>
+              </a:ln>
+            </p:spPr>
+            <p:style>
+              <a:lnRef idx="2">
+                <a:schemeClr val="accent1">
+                  <a:shade val="50000"/>
+                </a:schemeClr>
+              </a:lnRef>
+              <a:fillRef idx="1">
+                <a:schemeClr val="accent1"/>
+              </a:fillRef>
+              <a:effectRef idx="0">
+                <a:schemeClr val="accent1"/>
+              </a:effectRef>
+              <a:fontRef idx="minor">
+                <a:schemeClr val="lt1"/>
+              </a:fontRef>
+            </p:style>
+            <p:txBody>
+              <a:bodyPr rtlCol="0" anchor="ctr"/>
+              <a:lstStyle/>
+              <a:p>
+                <a:pPr algn="ctr"/>
+                <a:endParaRPr lang="es-AR" sz="1600"/>
+              </a:p>
+            </p:txBody>
+          </p:sp>
+          <p:sp>
+            <p:nvSpPr>
+              <p:cNvPr id="55" name="54 CuadroTexto"/>
+              <p:cNvSpPr txBox="1"/>
+              <p:nvPr/>
+            </p:nvSpPr>
+            <p:spPr>
+              <a:xfrm>
+                <a:off x="1402763" y="2425277"/>
+                <a:ext cx="1076325" cy="230832"/>
+              </a:xfrm>
+              <a:prstGeom prst="rect">
+                <a:avLst/>
+              </a:prstGeom>
+              <a:noFill/>
+            </p:spPr>
+            <p:txBody>
+              <a:bodyPr wrap="square" rtlCol="0">
+                <a:spAutoFit/>
+              </a:bodyPr>
+              <a:lstStyle/>
+              <a:p>
+                <a:pPr algn="ctr"/>
+                <a:r>
+                  <a:rPr lang="es-AR" sz="900" b="1" dirty="0" smtClean="0"/>
+                  <a:t>Servicio de Datos</a:t>
+                </a:r>
+                <a:endParaRPr lang="es-AR" sz="900" b="1" dirty="0"/>
+              </a:p>
+            </p:txBody>
+          </p:sp>
+        </p:grpSp>
       </p:grpSp>
       <p:cxnSp>
         <p:nvCxnSpPr>
@@ -4774,7 +4699,7 @@
                 <p:nvPr/>
               </p:nvPicPr>
               <p:blipFill>
-                <a:blip r:embed="rId10" cstate="print">
+                <a:blip r:embed="rId8" cstate="print">
                   <a:clrChange>
                     <a:clrFrom>
                       <a:srgbClr val="FFFFFF"/>
@@ -4811,7 +4736,7 @@
                 <p:nvPr/>
               </p:nvPicPr>
               <p:blipFill>
-                <a:blip r:embed="rId10" cstate="print">
+                <a:blip r:embed="rId8" cstate="print">
                   <a:clrChange>
                     <a:clrFrom>
                       <a:srgbClr val="FFFFFF"/>
@@ -4881,7 +4806,7 @@
             <p:nvPr/>
           </p:nvPicPr>
           <p:blipFill>
-            <a:blip r:embed="rId11" cstate="print"/>
+            <a:blip r:embed="rId9" cstate="print"/>
             <a:srcRect/>
             <a:stretch>
               <a:fillRect/>
@@ -4977,7 +4902,7 @@
               <p:nvPr/>
             </p:nvPicPr>
             <p:blipFill>
-              <a:blip r:embed="rId12" cstate="print"/>
+              <a:blip r:embed="rId10" cstate="print"/>
               <a:srcRect/>
               <a:stretch>
                 <a:fillRect/>
@@ -5033,7 +4958,7 @@
               <p:nvPr/>
             </p:nvPicPr>
             <p:blipFill>
-              <a:blip r:embed="rId13" cstate="print"/>
+              <a:blip r:embed="rId11" cstate="print"/>
               <a:srcRect/>
               <a:stretch>
                 <a:fillRect/>
@@ -5089,7 +5014,7 @@
               <p:nvPr/>
             </p:nvPicPr>
             <p:blipFill>
-              <a:blip r:embed="rId13" cstate="print"/>
+              <a:blip r:embed="rId11" cstate="print"/>
               <a:srcRect/>
               <a:stretch>
                 <a:fillRect/>
@@ -5145,7 +5070,7 @@
               <p:nvPr/>
             </p:nvPicPr>
             <p:blipFill>
-              <a:blip r:embed="rId13" cstate="print"/>
+              <a:blip r:embed="rId11" cstate="print"/>
               <a:srcRect/>
               <a:stretch>
                 <a:fillRect/>
@@ -5201,7 +5126,7 @@
               <p:nvPr/>
             </p:nvPicPr>
             <p:blipFill>
-              <a:blip r:embed="rId13" cstate="print"/>
+              <a:blip r:embed="rId11" cstate="print"/>
               <a:srcRect/>
               <a:stretch>
                 <a:fillRect/>
@@ -5257,7 +5182,7 @@
               <p:nvPr/>
             </p:nvPicPr>
             <p:blipFill>
-              <a:blip r:embed="rId13" cstate="print"/>
+              <a:blip r:embed="rId11" cstate="print"/>
               <a:srcRect/>
               <a:stretch>
                 <a:fillRect/>
@@ -5486,7 +5411,7 @@
             <p:nvPr/>
           </p:nvPicPr>
           <p:blipFill>
-            <a:blip r:embed="rId14" cstate="print">
+            <a:blip r:embed="rId12" cstate="print">
               <a:clrChange>
                 <a:clrFrom>
                   <a:srgbClr val="FFFFFF"/>
@@ -5518,6 +5443,142 @@
               <a:headEnd/>
               <a:tailEnd/>
             </a:ln>
+          </p:spPr>
+        </p:pic>
+      </p:grpSp>
+      <p:grpSp>
+        <p:nvGrpSpPr>
+          <p:cNvPr id="86" name="85 Grupo"/>
+          <p:cNvGrpSpPr/>
+          <p:nvPr/>
+        </p:nvGrpSpPr>
+        <p:grpSpPr>
+          <a:xfrm>
+            <a:off x="5154827" y="4541853"/>
+            <a:ext cx="1560298" cy="798522"/>
+            <a:chOff x="5145302" y="4570428"/>
+            <a:chExt cx="1560298" cy="798522"/>
+          </a:xfrm>
+        </p:grpSpPr>
+        <p:grpSp>
+          <p:nvGrpSpPr>
+            <p:cNvPr id="83" name="82 Grupo"/>
+            <p:cNvGrpSpPr/>
+            <p:nvPr/>
+          </p:nvGrpSpPr>
+          <p:grpSpPr>
+            <a:xfrm>
+              <a:off x="5145302" y="4570428"/>
+              <a:ext cx="1560298" cy="798522"/>
+              <a:chOff x="5135777" y="4560903"/>
+              <a:chExt cx="1560298" cy="798522"/>
+            </a:xfrm>
+          </p:grpSpPr>
+          <p:pic>
+            <p:nvPicPr>
+              <p:cNvPr id="1030" name="Picture 6"/>
+              <p:cNvPicPr>
+                <a:picLocks noChangeAspect="1" noChangeArrowheads="1"/>
+              </p:cNvPicPr>
+              <p:nvPr/>
+            </p:nvPicPr>
+            <p:blipFill>
+              <a:blip r:embed="rId13" cstate="print">
+                <a:clrChange>
+                  <a:clrFrom>
+                    <a:srgbClr val="FFFFFF"/>
+                  </a:clrFrom>
+                  <a:clrTo>
+                    <a:srgbClr val="FFFFFF">
+                      <a:alpha val="0"/>
+                    </a:srgbClr>
+                  </a:clrTo>
+                </a:clrChange>
+              </a:blip>
+              <a:srcRect/>
+              <a:stretch>
+                <a:fillRect/>
+              </a:stretch>
+            </p:blipFill>
+            <p:spPr bwMode="auto">
+              <a:xfrm>
+                <a:off x="5227217" y="4560903"/>
+                <a:ext cx="446791" cy="612742"/>
+              </a:xfrm>
+              <a:prstGeom prst="rect">
+                <a:avLst/>
+              </a:prstGeom>
+              <a:noFill/>
+              <a:ln w="9525">
+                <a:noFill/>
+                <a:miter lim="800000"/>
+                <a:headEnd/>
+                <a:tailEnd/>
+              </a:ln>
+            </p:spPr>
+          </p:pic>
+          <p:sp>
+            <p:nvSpPr>
+              <p:cNvPr id="123" name="122 CuadroTexto"/>
+              <p:cNvSpPr txBox="1"/>
+              <p:nvPr/>
+            </p:nvSpPr>
+            <p:spPr>
+              <a:xfrm>
+                <a:off x="5135777" y="5128593"/>
+                <a:ext cx="1560298" cy="230832"/>
+              </a:xfrm>
+              <a:prstGeom prst="rect">
+                <a:avLst/>
+              </a:prstGeom>
+              <a:noFill/>
+            </p:spPr>
+            <p:txBody>
+              <a:bodyPr wrap="square" rtlCol="0">
+                <a:spAutoFit/>
+              </a:bodyPr>
+              <a:lstStyle/>
+              <a:p>
+                <a:pPr algn="ctr"/>
+                <a:r>
+                  <a:rPr lang="es-AR" sz="900" b="1" dirty="0" err="1" smtClean="0"/>
+                  <a:t>SelfManagement</a:t>
+                </a:r>
+                <a:r>
+                  <a:rPr lang="es-AR" sz="900" b="1" dirty="0" smtClean="0"/>
+                  <a:t> Web </a:t>
+                </a:r>
+                <a:r>
+                  <a:rPr lang="es-AR" sz="900" b="1" dirty="0" err="1" smtClean="0"/>
+                  <a:t>Site</a:t>
+                </a:r>
+                <a:endParaRPr lang="es-AR" sz="900" b="1" dirty="0"/>
+              </a:p>
+            </p:txBody>
+          </p:sp>
+        </p:grpSp>
+        <p:pic>
+          <p:nvPicPr>
+            <p:cNvPr id="85" name="84 Imagen" descr="selfmanagement_logo2.png"/>
+            <p:cNvPicPr>
+              <a:picLocks noChangeAspect="1"/>
+            </p:cNvPicPr>
+            <p:nvPr/>
+          </p:nvPicPr>
+          <p:blipFill>
+            <a:blip r:embed="rId14" cstate="print"/>
+            <a:stretch>
+              <a:fillRect/>
+            </a:stretch>
+          </p:blipFill>
+          <p:spPr>
+            <a:xfrm>
+              <a:off x="5743575" y="4829175"/>
+              <a:ext cx="877725" cy="324000"/>
+            </a:xfrm>
+            <a:prstGeom prst="rect">
+              <a:avLst/>
+            </a:prstGeom>
           </p:spPr>
         </p:pic>
       </p:grpSp>

</xml_diff>

<commit_message>
# actulice el documento de Plan de Proyecto (WIP)
</commit_message>
<xml_diff>
--- a/analysisAndDesign/diagrama_arquitectura.pptx
+++ b/analysisAndDesign/diagrama_arquitectura.pptx
@@ -289,7 +289,7 @@
             <a:fld id="{6AD75CF8-61F3-42CF-B2E0-E50D03C7A83E}" type="datetimeFigureOut">
               <a:rPr lang="en-US" smtClean="0"/>
               <a:pPr/>
-              <a:t>9/5/2010</a:t>
+              <a:t>11/28/2010</a:t>
             </a:fld>
             <a:endParaRPr lang="en-US"/>
           </a:p>
@@ -456,7 +456,7 @@
             <a:fld id="{6AD75CF8-61F3-42CF-B2E0-E50D03C7A83E}" type="datetimeFigureOut">
               <a:rPr lang="en-US" smtClean="0"/>
               <a:pPr/>
-              <a:t>9/5/2010</a:t>
+              <a:t>11/28/2010</a:t>
             </a:fld>
             <a:endParaRPr lang="en-US"/>
           </a:p>
@@ -633,7 +633,7 @@
             <a:fld id="{6AD75CF8-61F3-42CF-B2E0-E50D03C7A83E}" type="datetimeFigureOut">
               <a:rPr lang="en-US" smtClean="0"/>
               <a:pPr/>
-              <a:t>9/5/2010</a:t>
+              <a:t>11/28/2010</a:t>
             </a:fld>
             <a:endParaRPr lang="en-US"/>
           </a:p>
@@ -800,7 +800,7 @@
             <a:fld id="{6AD75CF8-61F3-42CF-B2E0-E50D03C7A83E}" type="datetimeFigureOut">
               <a:rPr lang="en-US" smtClean="0"/>
               <a:pPr/>
-              <a:t>9/5/2010</a:t>
+              <a:t>11/28/2010</a:t>
             </a:fld>
             <a:endParaRPr lang="en-US"/>
           </a:p>
@@ -1043,7 +1043,7 @@
             <a:fld id="{6AD75CF8-61F3-42CF-B2E0-E50D03C7A83E}" type="datetimeFigureOut">
               <a:rPr lang="en-US" smtClean="0"/>
               <a:pPr/>
-              <a:t>9/5/2010</a:t>
+              <a:t>11/28/2010</a:t>
             </a:fld>
             <a:endParaRPr lang="en-US"/>
           </a:p>
@@ -1328,7 +1328,7 @@
             <a:fld id="{6AD75CF8-61F3-42CF-B2E0-E50D03C7A83E}" type="datetimeFigureOut">
               <a:rPr lang="en-US" smtClean="0"/>
               <a:pPr/>
-              <a:t>9/5/2010</a:t>
+              <a:t>11/28/2010</a:t>
             </a:fld>
             <a:endParaRPr lang="en-US"/>
           </a:p>
@@ -1747,7 +1747,7 @@
             <a:fld id="{6AD75CF8-61F3-42CF-B2E0-E50D03C7A83E}" type="datetimeFigureOut">
               <a:rPr lang="en-US" smtClean="0"/>
               <a:pPr/>
-              <a:t>9/5/2010</a:t>
+              <a:t>11/28/2010</a:t>
             </a:fld>
             <a:endParaRPr lang="en-US"/>
           </a:p>
@@ -1862,7 +1862,7 @@
             <a:fld id="{6AD75CF8-61F3-42CF-B2E0-E50D03C7A83E}" type="datetimeFigureOut">
               <a:rPr lang="en-US" smtClean="0"/>
               <a:pPr/>
-              <a:t>9/5/2010</a:t>
+              <a:t>11/28/2010</a:t>
             </a:fld>
             <a:endParaRPr lang="en-US"/>
           </a:p>
@@ -1954,7 +1954,7 @@
             <a:fld id="{6AD75CF8-61F3-42CF-B2E0-E50D03C7A83E}" type="datetimeFigureOut">
               <a:rPr lang="en-US" smtClean="0"/>
               <a:pPr/>
-              <a:t>9/5/2010</a:t>
+              <a:t>11/28/2010</a:t>
             </a:fld>
             <a:endParaRPr lang="en-US"/>
           </a:p>
@@ -2228,7 +2228,7 @@
             <a:fld id="{6AD75CF8-61F3-42CF-B2E0-E50D03C7A83E}" type="datetimeFigureOut">
               <a:rPr lang="en-US" smtClean="0"/>
               <a:pPr/>
-              <a:t>9/5/2010</a:t>
+              <a:t>11/28/2010</a:t>
             </a:fld>
             <a:endParaRPr lang="en-US"/>
           </a:p>
@@ -2478,7 +2478,7 @@
             <a:fld id="{6AD75CF8-61F3-42CF-B2E0-E50D03C7A83E}" type="datetimeFigureOut">
               <a:rPr lang="en-US" smtClean="0"/>
               <a:pPr/>
-              <a:t>9/5/2010</a:t>
+              <a:t>11/28/2010</a:t>
             </a:fld>
             <a:endParaRPr lang="en-US"/>
           </a:p>
@@ -2688,7 +2688,7 @@
             <a:fld id="{6AD75CF8-61F3-42CF-B2E0-E50D03C7A83E}" type="datetimeFigureOut">
               <a:rPr lang="en-US" smtClean="0"/>
               <a:pPr/>
-              <a:t>9/5/2010</a:t>
+              <a:t>11/28/2010</a:t>
             </a:fld>
             <a:endParaRPr lang="en-US"/>
           </a:p>
@@ -3672,104 +3672,54 @@
         </p:nvGrpSpPr>
         <p:grpSpPr>
           <a:xfrm>
-            <a:off x="2279838" y="3381622"/>
-            <a:ext cx="1346724" cy="668188"/>
-            <a:chOff x="2279838" y="3381622"/>
-            <a:chExt cx="1346724" cy="668188"/>
+            <a:off x="2124075" y="3228975"/>
+            <a:ext cx="1432449" cy="666357"/>
+            <a:chOff x="2194113" y="3257797"/>
+            <a:chExt cx="1432449" cy="666357"/>
           </a:xfrm>
         </p:grpSpPr>
-        <p:grpSp>
-          <p:nvGrpSpPr>
-            <p:cNvPr id="138" name="137 Grupo"/>
-            <p:cNvGrpSpPr/>
+        <p:sp>
+          <p:nvSpPr>
+            <p:cNvPr id="137" name="136 CuadroTexto"/>
+            <p:cNvSpPr txBox="1"/>
             <p:nvPr/>
-          </p:nvGrpSpPr>
-          <p:grpSpPr>
+          </p:nvSpPr>
+          <p:spPr>
             <a:xfrm>
-              <a:off x="2279838" y="3680478"/>
+              <a:off x="2194113" y="3257797"/>
               <a:ext cx="1295400" cy="369332"/>
-              <a:chOff x="1363290" y="2374175"/>
-              <a:chExt cx="1295400" cy="369332"/>
             </a:xfrm>
-          </p:grpSpPr>
-          <p:sp>
-            <p:nvSpPr>
-              <p:cNvPr id="136" name="135 Rectángulo"/>
-              <p:cNvSpPr/>
-              <p:nvPr/>
-            </p:nvSpPr>
-            <p:spPr>
-              <a:xfrm>
-                <a:off x="1518677" y="2459247"/>
-                <a:ext cx="930621" cy="216000"/>
-              </a:xfrm>
-              <a:prstGeom prst="rect">
-                <a:avLst/>
-              </a:prstGeom>
-              <a:solidFill>
-                <a:schemeClr val="bg1"/>
-              </a:solidFill>
-              <a:ln>
-                <a:noFill/>
-              </a:ln>
-            </p:spPr>
-            <p:style>
-              <a:lnRef idx="2">
-                <a:schemeClr val="accent1">
-                  <a:shade val="50000"/>
-                </a:schemeClr>
-              </a:lnRef>
-              <a:fillRef idx="1">
-                <a:schemeClr val="accent1"/>
-              </a:fillRef>
-              <a:effectRef idx="0">
-                <a:schemeClr val="accent1"/>
-              </a:effectRef>
-              <a:fontRef idx="minor">
-                <a:schemeClr val="lt1"/>
-              </a:fontRef>
-            </p:style>
-            <p:txBody>
-              <a:bodyPr rtlCol="0" anchor="ctr"/>
-              <a:lstStyle/>
-              <a:p>
-                <a:pPr algn="ctr"/>
-                <a:endParaRPr lang="es-AR" sz="1600"/>
-              </a:p>
-            </p:txBody>
-          </p:sp>
-          <p:sp>
-            <p:nvSpPr>
-              <p:cNvPr id="137" name="136 CuadroTexto"/>
-              <p:cNvSpPr txBox="1"/>
-              <p:nvPr/>
-            </p:nvSpPr>
-            <p:spPr>
-              <a:xfrm>
-                <a:off x="1363290" y="2374175"/>
-                <a:ext cx="1295400" cy="369332"/>
-              </a:xfrm>
-              <a:prstGeom prst="rect">
-                <a:avLst/>
-              </a:prstGeom>
-              <a:noFill/>
-            </p:spPr>
-            <p:txBody>
-              <a:bodyPr wrap="square" rtlCol="0">
-                <a:spAutoFit/>
-              </a:bodyPr>
-              <a:lstStyle/>
-              <a:p>
-                <a:pPr algn="ctr"/>
-                <a:r>
-                  <a:rPr lang="es-AR" sz="900" b="1" dirty="0" smtClean="0"/>
-                  <a:t>Servicio de Autenticación</a:t>
-                </a:r>
-                <a:endParaRPr lang="es-AR" sz="900" b="1" dirty="0"/>
-              </a:p>
-            </p:txBody>
-          </p:sp>
-        </p:grpSp>
+            <a:prstGeom prst="rect">
+              <a:avLst/>
+            </a:prstGeom>
+            <a:noFill/>
+          </p:spPr>
+          <p:txBody>
+            <a:bodyPr wrap="square" rtlCol="0">
+              <a:spAutoFit/>
+            </a:bodyPr>
+            <a:lstStyle/>
+            <a:p>
+              <a:pPr algn="ctr"/>
+              <a:r>
+                <a:rPr lang="es-AR" sz="900" b="1" dirty="0" smtClean="0"/>
+                <a:t>ASP.NET </a:t>
+              </a:r>
+            </a:p>
+            <a:p>
+              <a:pPr algn="ctr"/>
+              <a:r>
+                <a:rPr lang="es-AR" sz="900" b="1" dirty="0" err="1" smtClean="0"/>
+                <a:t>M</a:t>
+              </a:r>
+              <a:r>
+                <a:rPr lang="es-AR" sz="900" b="1" dirty="0" err="1" smtClean="0"/>
+                <a:t>embership</a:t>
+              </a:r>
+              <a:endParaRPr lang="es-AR" sz="900" b="1" dirty="0"/>
+            </a:p>
+          </p:txBody>
+        </p:sp>
         <p:pic>
           <p:nvPicPr>
             <p:cNvPr id="1028" name="Picture 4"/>
@@ -3958,36 +3908,6 @@
             <a:r>
               <a:rPr lang="es-AR" sz="900" dirty="0" err="1" smtClean="0"/>
               <a:t>Claims</a:t>
-            </a:r>
-            <a:endParaRPr lang="es-AR" sz="900" dirty="0"/>
-          </a:p>
-        </p:txBody>
-      </p:sp>
-      <p:sp>
-        <p:nvSpPr>
-          <p:cNvPr id="133" name="132 CuadroTexto"/>
-          <p:cNvSpPr txBox="1"/>
-          <p:nvPr/>
-        </p:nvSpPr>
-        <p:spPr>
-          <a:xfrm rot="1775871">
-            <a:off x="1984065" y="2894069"/>
-            <a:ext cx="579582" cy="230832"/>
-          </a:xfrm>
-          <a:prstGeom prst="rect">
-            <a:avLst/>
-          </a:prstGeom>
-          <a:noFill/>
-        </p:spPr>
-        <p:txBody>
-          <a:bodyPr wrap="square" rtlCol="0">
-            <a:spAutoFit/>
-          </a:bodyPr>
-          <a:lstStyle/>
-          <a:p>
-            <a:r>
-              <a:rPr lang="es-AR" sz="900" dirty="0" smtClean="0"/>
-              <a:t>ADFS</a:t>
             </a:r>
             <a:endParaRPr lang="es-AR" sz="900" dirty="0"/>
           </a:p>
@@ -4423,200 +4343,19 @@
           </p:spPr>
         </p:pic>
       </p:grpSp>
-      <p:grpSp>
-        <p:nvGrpSpPr>
-          <p:cNvPr id="88" name="87 Grupo"/>
-          <p:cNvGrpSpPr/>
-          <p:nvPr/>
-        </p:nvGrpSpPr>
-        <p:grpSpPr>
-          <a:xfrm>
-            <a:off x="4170273" y="2772023"/>
-            <a:ext cx="1398042" cy="542532"/>
-            <a:chOff x="4170273" y="2772023"/>
-            <a:chExt cx="1398042" cy="542532"/>
-          </a:xfrm>
-        </p:grpSpPr>
-        <p:pic>
-          <p:nvPicPr>
-            <p:cNvPr id="52" name="Picture 4"/>
-            <p:cNvPicPr>
-              <a:picLocks noChangeAspect="1" noChangeArrowheads="1"/>
-            </p:cNvPicPr>
-            <p:nvPr/>
-          </p:nvPicPr>
-          <p:blipFill>
-            <a:blip r:embed="rId6" cstate="print">
-              <a:clrChange>
-                <a:clrFrom>
-                  <a:srgbClr val="FFFFFF"/>
-                </a:clrFrom>
-                <a:clrTo>
-                  <a:srgbClr val="FFFFFF">
-                    <a:alpha val="0"/>
-                  </a:srgbClr>
-                </a:clrTo>
-              </a:clrChange>
-            </a:blip>
-            <a:srcRect/>
-            <a:stretch>
-              <a:fillRect/>
-            </a:stretch>
-          </p:blipFill>
-          <p:spPr bwMode="auto">
-            <a:xfrm rot="202572">
-              <a:off x="4170273" y="2772023"/>
-              <a:ext cx="465939" cy="542532"/>
-            </a:xfrm>
-            <a:prstGeom prst="rect">
-              <a:avLst/>
-            </a:prstGeom>
-            <a:noFill/>
-            <a:ln w="9525">
-              <a:noFill/>
-              <a:miter lim="800000"/>
-              <a:headEnd/>
-              <a:tailEnd/>
-            </a:ln>
-          </p:spPr>
-        </p:pic>
-        <p:grpSp>
-          <p:nvGrpSpPr>
-            <p:cNvPr id="53" name="52 Grupo"/>
-            <p:cNvGrpSpPr/>
-            <p:nvPr/>
-          </p:nvGrpSpPr>
-          <p:grpSpPr>
-            <a:xfrm>
-              <a:off x="4491990" y="3070225"/>
-              <a:ext cx="1076325" cy="230832"/>
-              <a:chOff x="1402763" y="2425277"/>
-              <a:chExt cx="1076325" cy="230832"/>
-            </a:xfrm>
-          </p:grpSpPr>
-          <p:sp>
-            <p:nvSpPr>
-              <p:cNvPr id="54" name="53 Rectángulo"/>
-              <p:cNvSpPr/>
-              <p:nvPr/>
-            </p:nvSpPr>
-            <p:spPr>
-              <a:xfrm>
-                <a:off x="1543050" y="2485600"/>
-                <a:ext cx="930323" cy="108000"/>
-              </a:xfrm>
-              <a:prstGeom prst="rect">
-                <a:avLst/>
-              </a:prstGeom>
-              <a:solidFill>
-                <a:schemeClr val="bg1"/>
-              </a:solidFill>
-              <a:ln>
-                <a:noFill/>
-              </a:ln>
-            </p:spPr>
-            <p:style>
-              <a:lnRef idx="2">
-                <a:schemeClr val="accent1">
-                  <a:shade val="50000"/>
-                </a:schemeClr>
-              </a:lnRef>
-              <a:fillRef idx="1">
-                <a:schemeClr val="accent1"/>
-              </a:fillRef>
-              <a:effectRef idx="0">
-                <a:schemeClr val="accent1"/>
-              </a:effectRef>
-              <a:fontRef idx="minor">
-                <a:schemeClr val="lt1"/>
-              </a:fontRef>
-            </p:style>
-            <p:txBody>
-              <a:bodyPr rtlCol="0" anchor="ctr"/>
-              <a:lstStyle/>
-              <a:p>
-                <a:pPr algn="ctr"/>
-                <a:endParaRPr lang="es-AR" sz="1600"/>
-              </a:p>
-            </p:txBody>
-          </p:sp>
-          <p:sp>
-            <p:nvSpPr>
-              <p:cNvPr id="55" name="54 CuadroTexto"/>
-              <p:cNvSpPr txBox="1"/>
-              <p:nvPr/>
-            </p:nvSpPr>
-            <p:spPr>
-              <a:xfrm>
-                <a:off x="1402763" y="2425277"/>
-                <a:ext cx="1076325" cy="230832"/>
-              </a:xfrm>
-              <a:prstGeom prst="rect">
-                <a:avLst/>
-              </a:prstGeom>
-              <a:noFill/>
-            </p:spPr>
-            <p:txBody>
-              <a:bodyPr wrap="square" rtlCol="0">
-                <a:spAutoFit/>
-              </a:bodyPr>
-              <a:lstStyle/>
-              <a:p>
-                <a:pPr algn="ctr"/>
-                <a:r>
-                  <a:rPr lang="es-AR" sz="900" b="1" dirty="0" smtClean="0"/>
-                  <a:t>Servicio de Datos</a:t>
-                </a:r>
-                <a:endParaRPr lang="es-AR" sz="900" b="1" dirty="0"/>
-              </a:p>
-            </p:txBody>
-          </p:sp>
-        </p:grpSp>
-      </p:grpSp>
       <p:cxnSp>
         <p:nvCxnSpPr>
-          <p:cNvPr id="56" name="55 Conector recto de flecha"/>
-          <p:cNvCxnSpPr/>
+          <p:cNvPr id="61" name="60 Conector recto de flecha"/>
+          <p:cNvCxnSpPr>
+            <a:stCxn id="1030" idx="0"/>
+            <a:endCxn id="1036" idx="2"/>
+          </p:cNvCxnSpPr>
           <p:nvPr/>
         </p:nvCxnSpPr>
         <p:spPr>
-          <a:xfrm rot="10800000" flipV="1">
-            <a:off x="4598852" y="2545286"/>
-            <a:ext cx="756000" cy="504000"/>
-          </a:xfrm>
-          <a:prstGeom prst="straightConnector1">
-            <a:avLst/>
-          </a:prstGeom>
-          <a:ln>
-            <a:headEnd type="arrow"/>
-            <a:tailEnd type="arrow"/>
-          </a:ln>
-        </p:spPr>
-        <p:style>
-          <a:lnRef idx="2">
-            <a:schemeClr val="accent1"/>
-          </a:lnRef>
-          <a:fillRef idx="0">
-            <a:schemeClr val="accent1"/>
-          </a:fillRef>
-          <a:effectRef idx="1">
-            <a:schemeClr val="accent1"/>
-          </a:effectRef>
-          <a:fontRef idx="minor">
-            <a:schemeClr val="tx1"/>
-          </a:fontRef>
-        </p:style>
-      </p:cxnSp>
-      <p:cxnSp>
-        <p:nvCxnSpPr>
-          <p:cNvPr id="61" name="60 Conector recto de flecha"/>
-          <p:cNvCxnSpPr/>
-          <p:nvPr/>
-        </p:nvCxnSpPr>
-        <p:spPr>
-          <a:xfrm rot="16200000" flipV="1">
-            <a:off x="4110491" y="3628962"/>
-            <a:ext cx="1387789" cy="777084"/>
+          <a:xfrm rot="5400000" flipH="1" flipV="1">
+            <a:off x="4553309" y="3549811"/>
+            <a:ext cx="1908397" cy="75689"/>
           </a:xfrm>
           <a:prstGeom prst="straightConnector1">
             <a:avLst/>
@@ -5318,134 +5057,6 @@
           </p:txBody>
         </p:sp>
       </p:grpSp>
-      <p:cxnSp>
-        <p:nvCxnSpPr>
-          <p:cNvPr id="125" name="124 Conector recto de flecha"/>
-          <p:cNvCxnSpPr/>
-          <p:nvPr/>
-        </p:nvCxnSpPr>
-        <p:spPr>
-          <a:xfrm rot="10800000">
-            <a:off x="1094882" y="2421198"/>
-            <a:ext cx="2052000" cy="1188000"/>
-          </a:xfrm>
-          <a:prstGeom prst="straightConnector1">
-            <a:avLst/>
-          </a:prstGeom>
-          <a:ln>
-            <a:headEnd type="arrow"/>
-            <a:tailEnd type="arrow"/>
-          </a:ln>
-        </p:spPr>
-        <p:style>
-          <a:lnRef idx="2">
-            <a:schemeClr val="accent1"/>
-          </a:lnRef>
-          <a:fillRef idx="0">
-            <a:schemeClr val="accent1"/>
-          </a:fillRef>
-          <a:effectRef idx="1">
-            <a:schemeClr val="accent1"/>
-          </a:effectRef>
-          <a:fontRef idx="minor">
-            <a:schemeClr val="tx1"/>
-          </a:fontRef>
-        </p:style>
-      </p:cxnSp>
-      <p:grpSp>
-        <p:nvGrpSpPr>
-          <p:cNvPr id="81" name="80 Grupo"/>
-          <p:cNvGrpSpPr/>
-          <p:nvPr/>
-        </p:nvGrpSpPr>
-        <p:grpSpPr>
-          <a:xfrm>
-            <a:off x="613752" y="1910513"/>
-            <a:ext cx="1095033" cy="612000"/>
-            <a:chOff x="613752" y="1910513"/>
-            <a:chExt cx="1095033" cy="612000"/>
-          </a:xfrm>
-        </p:grpSpPr>
-        <p:sp>
-          <p:nvSpPr>
-            <p:cNvPr id="113" name="112 CuadroTexto"/>
-            <p:cNvSpPr txBox="1"/>
-            <p:nvPr/>
-          </p:nvSpPr>
-          <p:spPr>
-            <a:xfrm>
-              <a:off x="975360" y="1984691"/>
-              <a:ext cx="733425" cy="369332"/>
-            </a:xfrm>
-            <a:prstGeom prst="rect">
-              <a:avLst/>
-            </a:prstGeom>
-            <a:noFill/>
-          </p:spPr>
-          <p:txBody>
-            <a:bodyPr wrap="square" rtlCol="0">
-              <a:spAutoFit/>
-            </a:bodyPr>
-            <a:lstStyle/>
-            <a:p>
-              <a:r>
-                <a:rPr lang="es-AR" sz="900" b="1" dirty="0" smtClean="0"/>
-                <a:t>Active </a:t>
-              </a:r>
-            </a:p>
-            <a:p>
-              <a:r>
-                <a:rPr lang="es-AR" sz="900" b="1" dirty="0" err="1" smtClean="0"/>
-                <a:t>Directory</a:t>
-              </a:r>
-              <a:endParaRPr lang="es-AR" sz="900" b="1" dirty="0"/>
-            </a:p>
-          </p:txBody>
-        </p:sp>
-        <p:pic>
-          <p:nvPicPr>
-            <p:cNvPr id="6" name="Picture 2"/>
-            <p:cNvPicPr>
-              <a:picLocks noChangeAspect="1" noChangeArrowheads="1"/>
-            </p:cNvPicPr>
-            <p:nvPr/>
-          </p:nvPicPr>
-          <p:blipFill>
-            <a:blip r:embed="rId12" cstate="print">
-              <a:clrChange>
-                <a:clrFrom>
-                  <a:srgbClr val="FFFFFF"/>
-                </a:clrFrom>
-                <a:clrTo>
-                  <a:srgbClr val="FFFFFF">
-                    <a:alpha val="0"/>
-                  </a:srgbClr>
-                </a:clrTo>
-              </a:clrChange>
-            </a:blip>
-            <a:srcRect/>
-            <a:stretch>
-              <a:fillRect/>
-            </a:stretch>
-          </p:blipFill>
-          <p:spPr bwMode="auto">
-            <a:xfrm rot="21376961">
-              <a:off x="613752" y="1910513"/>
-              <a:ext cx="425000" cy="612000"/>
-            </a:xfrm>
-            <a:prstGeom prst="rect">
-              <a:avLst/>
-            </a:prstGeom>
-            <a:noFill/>
-            <a:ln w="9525">
-              <a:noFill/>
-              <a:miter lim="800000"/>
-              <a:headEnd/>
-              <a:tailEnd/>
-            </a:ln>
-          </p:spPr>
-        </p:pic>
-      </p:grpSp>
       <p:grpSp>
         <p:nvGrpSpPr>
           <p:cNvPr id="86" name="85 Grupo"/>
@@ -5483,7 +5094,7 @@
               <p:nvPr/>
             </p:nvPicPr>
             <p:blipFill>
-              <a:blip r:embed="rId13" cstate="print">
+              <a:blip r:embed="rId12" cstate="print">
                 <a:clrChange>
                   <a:clrFrom>
                     <a:srgbClr val="FFFFFF"/>
@@ -5566,7 +5177,7 @@
             <p:nvPr/>
           </p:nvPicPr>
           <p:blipFill>
-            <a:blip r:embed="rId14" cstate="print"/>
+            <a:blip r:embed="rId13" cstate="print"/>
             <a:stretch>
               <a:fillRect/>
             </a:stretch>
@@ -5582,6 +5193,40 @@
           </p:spPr>
         </p:pic>
       </p:grpSp>
+      <p:cxnSp>
+        <p:nvCxnSpPr>
+          <p:cNvPr id="92" name="91 Conector recto de flecha"/>
+          <p:cNvCxnSpPr/>
+          <p:nvPr/>
+        </p:nvCxnSpPr>
+        <p:spPr>
+          <a:xfrm rot="10800000" flipV="1">
+            <a:off x="3556120" y="2505075"/>
+            <a:ext cx="1777880" cy="1152000"/>
+          </a:xfrm>
+          <a:prstGeom prst="straightConnector1">
+            <a:avLst/>
+          </a:prstGeom>
+          <a:ln>
+            <a:headEnd type="arrow"/>
+            <a:tailEnd type="arrow"/>
+          </a:ln>
+        </p:spPr>
+        <p:style>
+          <a:lnRef idx="2">
+            <a:schemeClr val="accent1"/>
+          </a:lnRef>
+          <a:fillRef idx="0">
+            <a:schemeClr val="accent1"/>
+          </a:fillRef>
+          <a:effectRef idx="1">
+            <a:schemeClr val="accent1"/>
+          </a:effectRef>
+          <a:fontRef idx="minor">
+            <a:schemeClr val="tx1"/>
+          </a:fontRef>
+        </p:style>
+      </p:cxnSp>
     </p:spTree>
   </p:cSld>
   <p:clrMapOvr>

</xml_diff>